<commit_message>
Some minor changes in some slides
</commit_message>
<xml_diff>
--- a/week5/2014-5-domscripting-js-v2-boyd.pptx
+++ b/week5/2014-5-domscripting-js-v2-boyd.pptx
@@ -146,7 +146,7 @@
   </p:defaultTextStyle>
   <p:extLst>
     <p:ext uri="{EFAFB233-063F-42B5-8137-9DF3F51BA10A}">
-      <p15:sldGuideLst xmlns="" xmlns:p15="http://schemas.microsoft.com/office/powerpoint/2012/main">
+      <p15:sldGuideLst xmlns:p15="http://schemas.microsoft.com/office/powerpoint/2012/main" xmlns="">
         <p15:guide id="1" orient="horz" pos="2160">
           <p15:clr>
             <a:srgbClr val="A4A3A4"/>
@@ -246,7 +246,7 @@
             <a:fld id="{C6EBFEAA-5427-1D4A-A9F6-53E7800DCEDE}" type="datetimeFigureOut">
               <a:rPr lang="nl-NL" smtClean="0"/>
               <a:pPr/>
-              <a:t>3-10-2014</a:t>
+              <a:t>13-10-2014</a:t>
             </a:fld>
             <a:endParaRPr lang="nl-NL"/>
           </a:p>
@@ -415,7 +415,7 @@
     </p:spTree>
     <p:extLst>
       <p:ext uri="{BB962C8B-B14F-4D97-AF65-F5344CB8AC3E}">
-        <p14:creationId xmlns="" xmlns:p14="http://schemas.microsoft.com/office/powerpoint/2010/main" val="3230414523"/>
+        <p14:creationId xmlns:p14="http://schemas.microsoft.com/office/powerpoint/2010/main" xmlns="" val="3230414523"/>
       </p:ext>
     </p:extLst>
   </p:cSld>
@@ -559,14 +559,7 @@
           <a:bodyPr/>
           <a:lstStyle/>
           <a:p>
-            <a:r>
-              <a:rPr lang="nl-NL" dirty="0" smtClean="0"/>
-              <a:t>Zie</a:t>
-            </a:r>
-            <a:r>
-              <a:rPr lang="nl-NL" baseline="0" dirty="0" smtClean="0"/>
-              <a:t> code-in-les/week5/assignment-in-class/array</a:t>
-            </a:r>
+            <a:endParaRPr lang="nl-NL" baseline="0" dirty="0" smtClean="0"/>
           </a:p>
         </p:txBody>
       </p:sp>
@@ -597,7 +590,7 @@
     </p:spTree>
     <p:extLst>
       <p:ext uri="{BB962C8B-B14F-4D97-AF65-F5344CB8AC3E}">
-        <p14:creationId xmlns="" xmlns:p14="http://schemas.microsoft.com/office/powerpoint/2010/main" val="2985902071"/>
+        <p14:creationId xmlns:p14="http://schemas.microsoft.com/office/powerpoint/2010/main" xmlns="" val="2985902071"/>
       </p:ext>
     </p:extLst>
   </p:cSld>
@@ -682,7 +675,7 @@
     </p:spTree>
     <p:extLst>
       <p:ext uri="{BB962C8B-B14F-4D97-AF65-F5344CB8AC3E}">
-        <p14:creationId xmlns="" xmlns:p14="http://schemas.microsoft.com/office/powerpoint/2010/main" val="2985902071"/>
+        <p14:creationId xmlns:p14="http://schemas.microsoft.com/office/powerpoint/2010/main" xmlns="" val="2985902071"/>
       </p:ext>
     </p:extLst>
   </p:cSld>
@@ -736,18 +729,6 @@
           <a:bodyPr/>
           <a:lstStyle/>
           <a:p>
-            <a:r>
-              <a:rPr lang="nl-NL" dirty="0" smtClean="0"/>
-              <a:t>Het</a:t>
-            </a:r>
-            <a:r>
-              <a:rPr lang="nl-NL" baseline="0" dirty="0" smtClean="0"/>
-              <a:t> is slim om de code uit de volgende dia’s voor te doen in </a:t>
-            </a:r>
-            <a:r>
-              <a:rPr lang="nl-NL" baseline="0" dirty="0" err="1" smtClean="0"/>
-              <a:t>phpstorm</a:t>
-            </a:r>
             <a:endParaRPr lang="nl-NL" dirty="0"/>
           </a:p>
         </p:txBody>
@@ -779,7 +760,7 @@
     </p:spTree>
     <p:extLst>
       <p:ext uri="{BB962C8B-B14F-4D97-AF65-F5344CB8AC3E}">
-        <p14:creationId xmlns="" xmlns:p14="http://schemas.microsoft.com/office/powerpoint/2010/main" val="3345336930"/>
+        <p14:creationId xmlns:p14="http://schemas.microsoft.com/office/powerpoint/2010/main" xmlns="" val="3345336930"/>
       </p:ext>
     </p:extLst>
   </p:cSld>
@@ -872,7 +853,7 @@
     </p:spTree>
     <p:extLst>
       <p:ext uri="{BB962C8B-B14F-4D97-AF65-F5344CB8AC3E}">
-        <p14:creationId xmlns="" xmlns:p14="http://schemas.microsoft.com/office/powerpoint/2010/main" val="170127230"/>
+        <p14:creationId xmlns:p14="http://schemas.microsoft.com/office/powerpoint/2010/main" xmlns="" val="170127230"/>
       </p:ext>
     </p:extLst>
   </p:cSld>
@@ -971,7 +952,7 @@
     </p:spTree>
     <p:extLst>
       <p:ext uri="{BB962C8B-B14F-4D97-AF65-F5344CB8AC3E}">
-        <p14:creationId xmlns="" xmlns:p14="http://schemas.microsoft.com/office/powerpoint/2010/main" val="170127230"/>
+        <p14:creationId xmlns:p14="http://schemas.microsoft.com/office/powerpoint/2010/main" xmlns="" val="170127230"/>
       </p:ext>
     </p:extLst>
   </p:cSld>
@@ -1056,7 +1037,7 @@
     </p:spTree>
     <p:extLst>
       <p:ext uri="{BB962C8B-B14F-4D97-AF65-F5344CB8AC3E}">
-        <p14:creationId xmlns="" xmlns:p14="http://schemas.microsoft.com/office/powerpoint/2010/main" val="2531556722"/>
+        <p14:creationId xmlns:p14="http://schemas.microsoft.com/office/powerpoint/2010/main" xmlns="" val="2531556722"/>
       </p:ext>
     </p:extLst>
   </p:cSld>
@@ -1167,7 +1148,7 @@
     </p:spTree>
     <p:extLst>
       <p:ext uri="{BB962C8B-B14F-4D97-AF65-F5344CB8AC3E}">
-        <p14:creationId xmlns="" xmlns:p14="http://schemas.microsoft.com/office/powerpoint/2010/main" val="170127230"/>
+        <p14:creationId xmlns:p14="http://schemas.microsoft.com/office/powerpoint/2010/main" xmlns="" val="170127230"/>
       </p:ext>
     </p:extLst>
   </p:cSld>
@@ -1260,7 +1241,7 @@
     </p:spTree>
     <p:extLst>
       <p:ext uri="{BB962C8B-B14F-4D97-AF65-F5344CB8AC3E}">
-        <p14:creationId xmlns="" xmlns:p14="http://schemas.microsoft.com/office/powerpoint/2010/main" val="170127230"/>
+        <p14:creationId xmlns:p14="http://schemas.microsoft.com/office/powerpoint/2010/main" xmlns="" val="170127230"/>
       </p:ext>
     </p:extLst>
   </p:cSld>
@@ -1345,7 +1326,7 @@
     </p:spTree>
     <p:extLst>
       <p:ext uri="{BB962C8B-B14F-4D97-AF65-F5344CB8AC3E}">
-        <p14:creationId xmlns="" xmlns:p14="http://schemas.microsoft.com/office/powerpoint/2010/main" val="170127230"/>
+        <p14:creationId xmlns:p14="http://schemas.microsoft.com/office/powerpoint/2010/main" xmlns="" val="170127230"/>
       </p:ext>
     </p:extLst>
   </p:cSld>
@@ -1438,7 +1419,7 @@
     </p:spTree>
     <p:extLst>
       <p:ext uri="{BB962C8B-B14F-4D97-AF65-F5344CB8AC3E}">
-        <p14:creationId xmlns="" xmlns:p14="http://schemas.microsoft.com/office/powerpoint/2010/main" val="170127230"/>
+        <p14:creationId xmlns:p14="http://schemas.microsoft.com/office/powerpoint/2010/main" xmlns="" val="170127230"/>
       </p:ext>
     </p:extLst>
   </p:cSld>
@@ -1558,7 +1539,7 @@
     </p:spTree>
     <p:extLst>
       <p:ext uri="{BB962C8B-B14F-4D97-AF65-F5344CB8AC3E}">
-        <p14:creationId xmlns="" xmlns:p14="http://schemas.microsoft.com/office/powerpoint/2010/main" val="2985902071"/>
+        <p14:creationId xmlns:p14="http://schemas.microsoft.com/office/powerpoint/2010/main" xmlns="" val="2985902071"/>
       </p:ext>
     </p:extLst>
   </p:cSld>
@@ -1651,7 +1632,7 @@
     </p:spTree>
     <p:extLst>
       <p:ext uri="{BB962C8B-B14F-4D97-AF65-F5344CB8AC3E}">
-        <p14:creationId xmlns="" xmlns:p14="http://schemas.microsoft.com/office/powerpoint/2010/main" val="170127230"/>
+        <p14:creationId xmlns:p14="http://schemas.microsoft.com/office/powerpoint/2010/main" xmlns="" val="170127230"/>
       </p:ext>
     </p:extLst>
   </p:cSld>
@@ -1744,7 +1725,7 @@
     </p:spTree>
     <p:extLst>
       <p:ext uri="{BB962C8B-B14F-4D97-AF65-F5344CB8AC3E}">
-        <p14:creationId xmlns="" xmlns:p14="http://schemas.microsoft.com/office/powerpoint/2010/main" val="170127230"/>
+        <p14:creationId xmlns:p14="http://schemas.microsoft.com/office/powerpoint/2010/main" xmlns="" val="170127230"/>
       </p:ext>
     </p:extLst>
   </p:cSld>
@@ -1837,7 +1818,7 @@
     </p:spTree>
     <p:extLst>
       <p:ext uri="{BB962C8B-B14F-4D97-AF65-F5344CB8AC3E}">
-        <p14:creationId xmlns="" xmlns:p14="http://schemas.microsoft.com/office/powerpoint/2010/main" val="170127230"/>
+        <p14:creationId xmlns:p14="http://schemas.microsoft.com/office/powerpoint/2010/main" xmlns="" val="170127230"/>
       </p:ext>
     </p:extLst>
   </p:cSld>
@@ -1930,7 +1911,7 @@
     </p:spTree>
     <p:extLst>
       <p:ext uri="{BB962C8B-B14F-4D97-AF65-F5344CB8AC3E}">
-        <p14:creationId xmlns="" xmlns:p14="http://schemas.microsoft.com/office/powerpoint/2010/main" val="170127230"/>
+        <p14:creationId xmlns:p14="http://schemas.microsoft.com/office/powerpoint/2010/main" xmlns="" val="170127230"/>
       </p:ext>
     </p:extLst>
   </p:cSld>
@@ -2050,7 +2031,7 @@
     </p:spTree>
     <p:extLst>
       <p:ext uri="{BB962C8B-B14F-4D97-AF65-F5344CB8AC3E}">
-        <p14:creationId xmlns="" xmlns:p14="http://schemas.microsoft.com/office/powerpoint/2010/main" val="2985902071"/>
+        <p14:creationId xmlns:p14="http://schemas.microsoft.com/office/powerpoint/2010/main" xmlns="" val="2985902071"/>
       </p:ext>
     </p:extLst>
   </p:cSld>
@@ -2104,14 +2085,6 @@
           <a:bodyPr/>
           <a:lstStyle/>
           <a:p>
-            <a:r>
-              <a:rPr lang="nl-NL" dirty="0" smtClean="0"/>
-              <a:t>Heeft iemand nog een site die hij/zij erg</a:t>
-            </a:r>
-            <a:r>
-              <a:rPr lang="nl-NL" baseline="0" dirty="0" smtClean="0"/>
-              <a:t> mooi vindt?</a:t>
-            </a:r>
             <a:endParaRPr lang="nl-NL" dirty="0" smtClean="0"/>
           </a:p>
         </p:txBody>
@@ -2143,7 +2116,7 @@
     </p:spTree>
     <p:extLst>
       <p:ext uri="{BB962C8B-B14F-4D97-AF65-F5344CB8AC3E}">
-        <p14:creationId xmlns="" xmlns:p14="http://schemas.microsoft.com/office/powerpoint/2010/main" val="3554293232"/>
+        <p14:creationId xmlns:p14="http://schemas.microsoft.com/office/powerpoint/2010/main" xmlns="" val="3554293232"/>
       </p:ext>
     </p:extLst>
   </p:cSld>
@@ -2228,7 +2201,7 @@
     </p:spTree>
     <p:extLst>
       <p:ext uri="{BB962C8B-B14F-4D97-AF65-F5344CB8AC3E}">
-        <p14:creationId xmlns="" xmlns:p14="http://schemas.microsoft.com/office/powerpoint/2010/main" val="4255636388"/>
+        <p14:creationId xmlns:p14="http://schemas.microsoft.com/office/powerpoint/2010/main" xmlns="" val="4255636388"/>
       </p:ext>
     </p:extLst>
   </p:cSld>
@@ -2313,7 +2286,7 @@
     </p:spTree>
     <p:extLst>
       <p:ext uri="{BB962C8B-B14F-4D97-AF65-F5344CB8AC3E}">
-        <p14:creationId xmlns="" xmlns:p14="http://schemas.microsoft.com/office/powerpoint/2010/main" val="2531556722"/>
+        <p14:creationId xmlns:p14="http://schemas.microsoft.com/office/powerpoint/2010/main" xmlns="" val="2531556722"/>
       </p:ext>
     </p:extLst>
   </p:cSld>
@@ -2398,7 +2371,7 @@
     </p:spTree>
     <p:extLst>
       <p:ext uri="{BB962C8B-B14F-4D97-AF65-F5344CB8AC3E}">
-        <p14:creationId xmlns="" xmlns:p14="http://schemas.microsoft.com/office/powerpoint/2010/main" val="2531556722"/>
+        <p14:creationId xmlns:p14="http://schemas.microsoft.com/office/powerpoint/2010/main" xmlns="" val="2531556722"/>
       </p:ext>
     </p:extLst>
   </p:cSld>
@@ -2491,7 +2464,7 @@
     </p:spTree>
     <p:extLst>
       <p:ext uri="{BB962C8B-B14F-4D97-AF65-F5344CB8AC3E}">
-        <p14:creationId xmlns="" xmlns:p14="http://schemas.microsoft.com/office/powerpoint/2010/main" val="170127230"/>
+        <p14:creationId xmlns:p14="http://schemas.microsoft.com/office/powerpoint/2010/main" xmlns="" val="170127230"/>
       </p:ext>
     </p:extLst>
   </p:cSld>
@@ -2545,22 +2518,6 @@
           <a:bodyPr/>
           <a:lstStyle/>
           <a:p>
-            <a:r>
-              <a:rPr lang="nl-NL" dirty="0" smtClean="0"/>
-              <a:t>In de</a:t>
-            </a:r>
-            <a:r>
-              <a:rPr lang="nl-NL" baseline="0" dirty="0" smtClean="0"/>
-              <a:t> voorbeelden die hier volgen kun je ook goed maken in </a:t>
-            </a:r>
-            <a:r>
-              <a:rPr lang="nl-NL" baseline="0" dirty="0" err="1" smtClean="0"/>
-              <a:t>php</a:t>
-            </a:r>
-            <a:r>
-              <a:rPr lang="nl-NL" baseline="0" dirty="0" smtClean="0"/>
-              <a:t> storm</a:t>
-            </a:r>
             <a:endParaRPr lang="nl-NL" dirty="0"/>
           </a:p>
         </p:txBody>
@@ -2592,7 +2549,7 @@
     </p:spTree>
     <p:extLst>
       <p:ext uri="{BB962C8B-B14F-4D97-AF65-F5344CB8AC3E}">
-        <p14:creationId xmlns="" xmlns:p14="http://schemas.microsoft.com/office/powerpoint/2010/main" val="1689505139"/>
+        <p14:creationId xmlns:p14="http://schemas.microsoft.com/office/powerpoint/2010/main" xmlns="" val="1689505139"/>
       </p:ext>
     </p:extLst>
   </p:cSld>
@@ -2685,7 +2642,7 @@
     </p:spTree>
     <p:extLst>
       <p:ext uri="{BB962C8B-B14F-4D97-AF65-F5344CB8AC3E}">
-        <p14:creationId xmlns="" xmlns:p14="http://schemas.microsoft.com/office/powerpoint/2010/main" val="170127230"/>
+        <p14:creationId xmlns:p14="http://schemas.microsoft.com/office/powerpoint/2010/main" xmlns="" val="170127230"/>
       </p:ext>
     </p:extLst>
   </p:cSld>
@@ -2770,7 +2727,7 @@
     </p:spTree>
     <p:extLst>
       <p:ext uri="{BB962C8B-B14F-4D97-AF65-F5344CB8AC3E}">
-        <p14:creationId xmlns="" xmlns:p14="http://schemas.microsoft.com/office/powerpoint/2010/main" val="2531556722"/>
+        <p14:creationId xmlns:p14="http://schemas.microsoft.com/office/powerpoint/2010/main" xmlns="" val="2531556722"/>
       </p:ext>
     </p:extLst>
   </p:cSld>
@@ -2962,7 +2919,7 @@
             <a:fld id="{67F3BEE5-94E6-E445-95DA-CAD88A30EC74}" type="datetimeFigureOut">
               <a:rPr lang="nl-NL" smtClean="0"/>
               <a:pPr/>
-              <a:t>3-10-2014</a:t>
+              <a:t>13-10-2014</a:t>
             </a:fld>
             <a:endParaRPr lang="nl-NL"/>
           </a:p>
@@ -3014,7 +2971,7 @@
     </p:spTree>
     <p:extLst>
       <p:ext uri="{BB962C8B-B14F-4D97-AF65-F5344CB8AC3E}">
-        <p14:creationId xmlns="" xmlns:p14="http://schemas.microsoft.com/office/powerpoint/2010/main" val="1609621839"/>
+        <p14:creationId xmlns:p14="http://schemas.microsoft.com/office/powerpoint/2010/main" xmlns="" val="1609621839"/>
       </p:ext>
     </p:extLst>
   </p:cSld>
@@ -3134,7 +3091,7 @@
             <a:fld id="{67F3BEE5-94E6-E445-95DA-CAD88A30EC74}" type="datetimeFigureOut">
               <a:rPr lang="nl-NL" smtClean="0"/>
               <a:pPr/>
-              <a:t>3-10-2014</a:t>
+              <a:t>13-10-2014</a:t>
             </a:fld>
             <a:endParaRPr lang="nl-NL"/>
           </a:p>
@@ -3186,7 +3143,7 @@
     </p:spTree>
     <p:extLst>
       <p:ext uri="{BB962C8B-B14F-4D97-AF65-F5344CB8AC3E}">
-        <p14:creationId xmlns="" xmlns:p14="http://schemas.microsoft.com/office/powerpoint/2010/main" val="1295549590"/>
+        <p14:creationId xmlns:p14="http://schemas.microsoft.com/office/powerpoint/2010/main" xmlns="" val="1295549590"/>
       </p:ext>
     </p:extLst>
   </p:cSld>
@@ -3316,7 +3273,7 @@
             <a:fld id="{67F3BEE5-94E6-E445-95DA-CAD88A30EC74}" type="datetimeFigureOut">
               <a:rPr lang="nl-NL" smtClean="0"/>
               <a:pPr/>
-              <a:t>3-10-2014</a:t>
+              <a:t>13-10-2014</a:t>
             </a:fld>
             <a:endParaRPr lang="nl-NL"/>
           </a:p>
@@ -3368,7 +3325,7 @@
     </p:spTree>
     <p:extLst>
       <p:ext uri="{BB962C8B-B14F-4D97-AF65-F5344CB8AC3E}">
-        <p14:creationId xmlns="" xmlns:p14="http://schemas.microsoft.com/office/powerpoint/2010/main" val="2596447324"/>
+        <p14:creationId xmlns:p14="http://schemas.microsoft.com/office/powerpoint/2010/main" xmlns="" val="2596447324"/>
       </p:ext>
     </p:extLst>
   </p:cSld>
@@ -3488,7 +3445,7 @@
             <a:fld id="{67F3BEE5-94E6-E445-95DA-CAD88A30EC74}" type="datetimeFigureOut">
               <a:rPr lang="nl-NL" smtClean="0"/>
               <a:pPr/>
-              <a:t>3-10-2014</a:t>
+              <a:t>13-10-2014</a:t>
             </a:fld>
             <a:endParaRPr lang="nl-NL"/>
           </a:p>
@@ -3540,7 +3497,7 @@
     </p:spTree>
     <p:extLst>
       <p:ext uri="{BB962C8B-B14F-4D97-AF65-F5344CB8AC3E}">
-        <p14:creationId xmlns="" xmlns:p14="http://schemas.microsoft.com/office/powerpoint/2010/main" val="3529887062"/>
+        <p14:creationId xmlns:p14="http://schemas.microsoft.com/office/powerpoint/2010/main" xmlns="" val="3529887062"/>
       </p:ext>
     </p:extLst>
   </p:cSld>
@@ -3736,7 +3693,7 @@
             <a:fld id="{67F3BEE5-94E6-E445-95DA-CAD88A30EC74}" type="datetimeFigureOut">
               <a:rPr lang="nl-NL" smtClean="0"/>
               <a:pPr/>
-              <a:t>3-10-2014</a:t>
+              <a:t>13-10-2014</a:t>
             </a:fld>
             <a:endParaRPr lang="nl-NL"/>
           </a:p>
@@ -3788,7 +3745,7 @@
     </p:spTree>
     <p:extLst>
       <p:ext uri="{BB962C8B-B14F-4D97-AF65-F5344CB8AC3E}">
-        <p14:creationId xmlns="" xmlns:p14="http://schemas.microsoft.com/office/powerpoint/2010/main" val="1504421425"/>
+        <p14:creationId xmlns:p14="http://schemas.microsoft.com/office/powerpoint/2010/main" xmlns="" val="1504421425"/>
       </p:ext>
     </p:extLst>
   </p:cSld>
@@ -4026,7 +3983,7 @@
             <a:fld id="{67F3BEE5-94E6-E445-95DA-CAD88A30EC74}" type="datetimeFigureOut">
               <a:rPr lang="nl-NL" smtClean="0"/>
               <a:pPr/>
-              <a:t>3-10-2014</a:t>
+              <a:t>13-10-2014</a:t>
             </a:fld>
             <a:endParaRPr lang="nl-NL"/>
           </a:p>
@@ -4078,7 +4035,7 @@
     </p:spTree>
     <p:extLst>
       <p:ext uri="{BB962C8B-B14F-4D97-AF65-F5344CB8AC3E}">
-        <p14:creationId xmlns="" xmlns:p14="http://schemas.microsoft.com/office/powerpoint/2010/main" val="985573502"/>
+        <p14:creationId xmlns:p14="http://schemas.microsoft.com/office/powerpoint/2010/main" xmlns="" val="985573502"/>
       </p:ext>
     </p:extLst>
   </p:cSld>
@@ -4450,7 +4407,7 @@
             <a:fld id="{67F3BEE5-94E6-E445-95DA-CAD88A30EC74}" type="datetimeFigureOut">
               <a:rPr lang="nl-NL" smtClean="0"/>
               <a:pPr/>
-              <a:t>3-10-2014</a:t>
+              <a:t>13-10-2014</a:t>
             </a:fld>
             <a:endParaRPr lang="nl-NL"/>
           </a:p>
@@ -4502,7 +4459,7 @@
     </p:spTree>
     <p:extLst>
       <p:ext uri="{BB962C8B-B14F-4D97-AF65-F5344CB8AC3E}">
-        <p14:creationId xmlns="" xmlns:p14="http://schemas.microsoft.com/office/powerpoint/2010/main" val="3892708282"/>
+        <p14:creationId xmlns:p14="http://schemas.microsoft.com/office/powerpoint/2010/main" xmlns="" val="3892708282"/>
       </p:ext>
     </p:extLst>
   </p:cSld>
@@ -4570,7 +4527,7 @@
             <a:fld id="{67F3BEE5-94E6-E445-95DA-CAD88A30EC74}" type="datetimeFigureOut">
               <a:rPr lang="nl-NL" smtClean="0"/>
               <a:pPr/>
-              <a:t>3-10-2014</a:t>
+              <a:t>13-10-2014</a:t>
             </a:fld>
             <a:endParaRPr lang="nl-NL"/>
           </a:p>
@@ -4622,7 +4579,7 @@
     </p:spTree>
     <p:extLst>
       <p:ext uri="{BB962C8B-B14F-4D97-AF65-F5344CB8AC3E}">
-        <p14:creationId xmlns="" xmlns:p14="http://schemas.microsoft.com/office/powerpoint/2010/main" val="47706445"/>
+        <p14:creationId xmlns:p14="http://schemas.microsoft.com/office/powerpoint/2010/main" xmlns="" val="47706445"/>
       </p:ext>
     </p:extLst>
   </p:cSld>
@@ -4667,7 +4624,7 @@
             <a:fld id="{67F3BEE5-94E6-E445-95DA-CAD88A30EC74}" type="datetimeFigureOut">
               <a:rPr lang="nl-NL" smtClean="0"/>
               <a:pPr/>
-              <a:t>3-10-2014</a:t>
+              <a:t>13-10-2014</a:t>
             </a:fld>
             <a:endParaRPr lang="nl-NL"/>
           </a:p>
@@ -4719,7 +4676,7 @@
     </p:spTree>
     <p:extLst>
       <p:ext uri="{BB962C8B-B14F-4D97-AF65-F5344CB8AC3E}">
-        <p14:creationId xmlns="" xmlns:p14="http://schemas.microsoft.com/office/powerpoint/2010/main" val="415016955"/>
+        <p14:creationId xmlns:p14="http://schemas.microsoft.com/office/powerpoint/2010/main" xmlns="" val="415016955"/>
       </p:ext>
     </p:extLst>
   </p:cSld>
@@ -4946,7 +4903,7 @@
             <a:fld id="{67F3BEE5-94E6-E445-95DA-CAD88A30EC74}" type="datetimeFigureOut">
               <a:rPr lang="nl-NL" smtClean="0"/>
               <a:pPr/>
-              <a:t>3-10-2014</a:t>
+              <a:t>13-10-2014</a:t>
             </a:fld>
             <a:endParaRPr lang="nl-NL"/>
           </a:p>
@@ -4998,7 +4955,7 @@
     </p:spTree>
     <p:extLst>
       <p:ext uri="{BB962C8B-B14F-4D97-AF65-F5344CB8AC3E}">
-        <p14:creationId xmlns="" xmlns:p14="http://schemas.microsoft.com/office/powerpoint/2010/main" val="278754095"/>
+        <p14:creationId xmlns:p14="http://schemas.microsoft.com/office/powerpoint/2010/main" xmlns="" val="278754095"/>
       </p:ext>
     </p:extLst>
   </p:cSld>
@@ -5201,7 +5158,7 @@
             <a:fld id="{67F3BEE5-94E6-E445-95DA-CAD88A30EC74}" type="datetimeFigureOut">
               <a:rPr lang="nl-NL" smtClean="0"/>
               <a:pPr/>
-              <a:t>3-10-2014</a:t>
+              <a:t>13-10-2014</a:t>
             </a:fld>
             <a:endParaRPr lang="nl-NL"/>
           </a:p>
@@ -5253,7 +5210,7 @@
     </p:spTree>
     <p:extLst>
       <p:ext uri="{BB962C8B-B14F-4D97-AF65-F5344CB8AC3E}">
-        <p14:creationId xmlns="" xmlns:p14="http://schemas.microsoft.com/office/powerpoint/2010/main" val="2828589501"/>
+        <p14:creationId xmlns:p14="http://schemas.microsoft.com/office/powerpoint/2010/main" xmlns="" val="2828589501"/>
       </p:ext>
     </p:extLst>
   </p:cSld>
@@ -5416,7 +5373,7 @@
             <a:fld id="{67F3BEE5-94E6-E445-95DA-CAD88A30EC74}" type="datetimeFigureOut">
               <a:rPr lang="nl-NL" smtClean="0"/>
               <a:pPr/>
-              <a:t>3-10-2014</a:t>
+              <a:t>13-10-2014</a:t>
             </a:fld>
             <a:endParaRPr lang="nl-NL"/>
           </a:p>
@@ -5504,7 +5461,7 @@
     </p:spTree>
     <p:extLst>
       <p:ext uri="{BB962C8B-B14F-4D97-AF65-F5344CB8AC3E}">
-        <p14:creationId xmlns="" xmlns:p14="http://schemas.microsoft.com/office/powerpoint/2010/main" val="22387284"/>
+        <p14:creationId xmlns:p14="http://schemas.microsoft.com/office/powerpoint/2010/main" xmlns="" val="22387284"/>
       </p:ext>
     </p:extLst>
   </p:cSld>
@@ -5894,7 +5851,7 @@
     </p:spTree>
     <p:extLst>
       <p:ext uri="{BB962C8B-B14F-4D97-AF65-F5344CB8AC3E}">
-        <p14:creationId xmlns="" xmlns:p14="http://schemas.microsoft.com/office/powerpoint/2010/main" val="668355121"/>
+        <p14:creationId xmlns:p14="http://schemas.microsoft.com/office/powerpoint/2010/main" xmlns="" val="668355121"/>
       </p:ext>
     </p:extLst>
   </p:cSld>
@@ -6959,7 +6916,7 @@
     </p:spTree>
     <p:extLst>
       <p:ext uri="{BB962C8B-B14F-4D97-AF65-F5344CB8AC3E}">
-        <p14:creationId xmlns="" xmlns:p14="http://schemas.microsoft.com/office/powerpoint/2010/main" val="3166308526"/>
+        <p14:creationId xmlns:p14="http://schemas.microsoft.com/office/powerpoint/2010/main" xmlns="" val="3166308526"/>
       </p:ext>
     </p:extLst>
   </p:cSld>
@@ -8179,7 +8136,7 @@
     </p:spTree>
     <p:extLst>
       <p:ext uri="{BB962C8B-B14F-4D97-AF65-F5344CB8AC3E}">
-        <p14:creationId xmlns="" xmlns:p14="http://schemas.microsoft.com/office/powerpoint/2010/main" val="3166308526"/>
+        <p14:creationId xmlns:p14="http://schemas.microsoft.com/office/powerpoint/2010/main" xmlns="" val="3166308526"/>
       </p:ext>
     </p:extLst>
   </p:cSld>
@@ -8447,7 +8404,7 @@
     </p:spTree>
     <p:extLst>
       <p:ext uri="{BB962C8B-B14F-4D97-AF65-F5344CB8AC3E}">
-        <p14:creationId xmlns="" xmlns:p14="http://schemas.microsoft.com/office/powerpoint/2010/main" val="1831490597"/>
+        <p14:creationId xmlns:p14="http://schemas.microsoft.com/office/powerpoint/2010/main" xmlns="" val="1831490597"/>
       </p:ext>
     </p:extLst>
   </p:cSld>
@@ -8581,7 +8538,7 @@
     </p:spTree>
     <p:extLst>
       <p:ext uri="{BB962C8B-B14F-4D97-AF65-F5344CB8AC3E}">
-        <p14:creationId xmlns="" xmlns:p14="http://schemas.microsoft.com/office/powerpoint/2010/main" val="2851367578"/>
+        <p14:creationId xmlns:p14="http://schemas.microsoft.com/office/powerpoint/2010/main" xmlns="" val="2851367578"/>
       </p:ext>
     </p:extLst>
   </p:cSld>
@@ -9491,7 +9448,7 @@
     </p:spTree>
     <p:extLst>
       <p:ext uri="{BB962C8B-B14F-4D97-AF65-F5344CB8AC3E}">
-        <p14:creationId xmlns="" xmlns:p14="http://schemas.microsoft.com/office/powerpoint/2010/main" val="1681030328"/>
+        <p14:creationId xmlns:p14="http://schemas.microsoft.com/office/powerpoint/2010/main" xmlns="" val="1681030328"/>
       </p:ext>
     </p:extLst>
   </p:cSld>
@@ -9537,7 +9494,7 @@
           <a:blip r:embed="rId3">
             <a:extLst>
               <a:ext uri="{28A0092B-C50C-407E-A947-70E740481C1C}">
-                <a14:useLocalDpi xmlns="" xmlns:a14="http://schemas.microsoft.com/office/drawing/2010/main" val="0"/>
+                <a14:useLocalDpi xmlns:a14="http://schemas.microsoft.com/office/drawing/2010/main" xmlns="" val="0"/>
               </a:ext>
             </a:extLst>
           </a:blip>
@@ -9909,7 +9866,7 @@
     </p:spTree>
     <p:extLst>
       <p:ext uri="{BB962C8B-B14F-4D97-AF65-F5344CB8AC3E}">
-        <p14:creationId xmlns="" xmlns:p14="http://schemas.microsoft.com/office/powerpoint/2010/main" val="2205736978"/>
+        <p14:creationId xmlns:p14="http://schemas.microsoft.com/office/powerpoint/2010/main" xmlns="" val="2205736978"/>
       </p:ext>
     </p:extLst>
   </p:cSld>
@@ -11279,7 +11236,7 @@
     </p:spTree>
     <p:extLst>
       <p:ext uri="{BB962C8B-B14F-4D97-AF65-F5344CB8AC3E}">
-        <p14:creationId xmlns="" xmlns:p14="http://schemas.microsoft.com/office/powerpoint/2010/main" val="3555217544"/>
+        <p14:creationId xmlns:p14="http://schemas.microsoft.com/office/powerpoint/2010/main" xmlns="" val="3555217544"/>
       </p:ext>
     </p:extLst>
   </p:cSld>
@@ -12711,7 +12668,7 @@
     </p:spTree>
     <p:extLst>
       <p:ext uri="{BB962C8B-B14F-4D97-AF65-F5344CB8AC3E}">
-        <p14:creationId xmlns="" xmlns:p14="http://schemas.microsoft.com/office/powerpoint/2010/main" val="3555217544"/>
+        <p14:creationId xmlns:p14="http://schemas.microsoft.com/office/powerpoint/2010/main" xmlns="" val="3555217544"/>
       </p:ext>
     </p:extLst>
   </p:cSld>
@@ -13785,7 +13742,7 @@
     </p:spTree>
     <p:extLst>
       <p:ext uri="{BB962C8B-B14F-4D97-AF65-F5344CB8AC3E}">
-        <p14:creationId xmlns="" xmlns:p14="http://schemas.microsoft.com/office/powerpoint/2010/main" val="1681030328"/>
+        <p14:creationId xmlns:p14="http://schemas.microsoft.com/office/powerpoint/2010/main" xmlns="" val="1681030328"/>
       </p:ext>
     </p:extLst>
   </p:cSld>
@@ -13931,7 +13888,7 @@
     </p:spTree>
     <p:extLst>
       <p:ext uri="{BB962C8B-B14F-4D97-AF65-F5344CB8AC3E}">
-        <p14:creationId xmlns="" xmlns:p14="http://schemas.microsoft.com/office/powerpoint/2010/main" val="375675987"/>
+        <p14:creationId xmlns:p14="http://schemas.microsoft.com/office/powerpoint/2010/main" xmlns="" val="375675987"/>
       </p:ext>
     </p:extLst>
   </p:cSld>
@@ -14065,7 +14022,7 @@
     </p:spTree>
     <p:extLst>
       <p:ext uri="{BB962C8B-B14F-4D97-AF65-F5344CB8AC3E}">
-        <p14:creationId xmlns="" xmlns:p14="http://schemas.microsoft.com/office/powerpoint/2010/main" val="3553283071"/>
+        <p14:creationId xmlns:p14="http://schemas.microsoft.com/office/powerpoint/2010/main" xmlns="" val="3553283071"/>
       </p:ext>
     </p:extLst>
   </p:cSld>
@@ -15086,7 +15043,7 @@
     </p:spTree>
     <p:extLst>
       <p:ext uri="{BB962C8B-B14F-4D97-AF65-F5344CB8AC3E}">
-        <p14:creationId xmlns="" xmlns:p14="http://schemas.microsoft.com/office/powerpoint/2010/main" val="1170793720"/>
+        <p14:creationId xmlns:p14="http://schemas.microsoft.com/office/powerpoint/2010/main" xmlns="" val="1170793720"/>
       </p:ext>
     </p:extLst>
   </p:cSld>
@@ -15825,7 +15782,7 @@
     </p:spTree>
     <p:extLst>
       <p:ext uri="{BB962C8B-B14F-4D97-AF65-F5344CB8AC3E}">
-        <p14:creationId xmlns="" xmlns:p14="http://schemas.microsoft.com/office/powerpoint/2010/main" val="2357490074"/>
+        <p14:creationId xmlns:p14="http://schemas.microsoft.com/office/powerpoint/2010/main" xmlns="" val="2357490074"/>
       </p:ext>
     </p:extLst>
   </p:cSld>
@@ -15993,7 +15950,7 @@
     </p:spTree>
     <p:extLst>
       <p:ext uri="{BB962C8B-B14F-4D97-AF65-F5344CB8AC3E}">
-        <p14:creationId xmlns="" xmlns:p14="http://schemas.microsoft.com/office/powerpoint/2010/main" val="2472753290"/>
+        <p14:creationId xmlns:p14="http://schemas.microsoft.com/office/powerpoint/2010/main" xmlns="" val="2472753290"/>
       </p:ext>
     </p:extLst>
   </p:cSld>
@@ -16149,7 +16106,7 @@
     </p:spTree>
     <p:extLst>
       <p:ext uri="{BB962C8B-B14F-4D97-AF65-F5344CB8AC3E}">
-        <p14:creationId xmlns="" xmlns:p14="http://schemas.microsoft.com/office/powerpoint/2010/main" val="67454405"/>
+        <p14:creationId xmlns:p14="http://schemas.microsoft.com/office/powerpoint/2010/main" xmlns="" val="67454405"/>
       </p:ext>
     </p:extLst>
   </p:cSld>
@@ -17765,7 +17722,7 @@
     </p:spTree>
     <p:extLst>
       <p:ext uri="{BB962C8B-B14F-4D97-AF65-F5344CB8AC3E}">
-        <p14:creationId xmlns="" xmlns:p14="http://schemas.microsoft.com/office/powerpoint/2010/main" val="1681030328"/>
+        <p14:creationId xmlns:p14="http://schemas.microsoft.com/office/powerpoint/2010/main" xmlns="" val="1681030328"/>
       </p:ext>
     </p:extLst>
   </p:cSld>
@@ -18786,7 +18743,7 @@
     </p:spTree>
     <p:extLst>
       <p:ext uri="{BB962C8B-B14F-4D97-AF65-F5344CB8AC3E}">
-        <p14:creationId xmlns="" xmlns:p14="http://schemas.microsoft.com/office/powerpoint/2010/main" val="2506049415"/>
+        <p14:creationId xmlns:p14="http://schemas.microsoft.com/office/powerpoint/2010/main" xmlns="" val="2506049415"/>
       </p:ext>
     </p:extLst>
   </p:cSld>
@@ -20204,7 +20161,7 @@
     </p:spTree>
     <p:extLst>
       <p:ext uri="{BB962C8B-B14F-4D97-AF65-F5344CB8AC3E}">
-        <p14:creationId xmlns="" xmlns:p14="http://schemas.microsoft.com/office/powerpoint/2010/main" val="466784211"/>
+        <p14:creationId xmlns:p14="http://schemas.microsoft.com/office/powerpoint/2010/main" xmlns="" val="466784211"/>
       </p:ext>
     </p:extLst>
   </p:cSld>
@@ -22334,7 +22291,7 @@
     </p:spTree>
     <p:extLst>
       <p:ext uri="{BB962C8B-B14F-4D97-AF65-F5344CB8AC3E}">
-        <p14:creationId xmlns="" xmlns:p14="http://schemas.microsoft.com/office/powerpoint/2010/main" val="2261162403"/>
+        <p14:creationId xmlns:p14="http://schemas.microsoft.com/office/powerpoint/2010/main" xmlns="" val="2261162403"/>
       </p:ext>
     </p:extLst>
   </p:cSld>
@@ -24273,7 +24230,7 @@
     </p:spTree>
     <p:extLst>
       <p:ext uri="{BB962C8B-B14F-4D97-AF65-F5344CB8AC3E}">
-        <p14:creationId xmlns="" xmlns:p14="http://schemas.microsoft.com/office/powerpoint/2010/main" val="977755755"/>
+        <p14:creationId xmlns:p14="http://schemas.microsoft.com/office/powerpoint/2010/main" xmlns="" val="977755755"/>
       </p:ext>
     </p:extLst>
   </p:cSld>
@@ -25851,7 +25808,7 @@
     </p:spTree>
     <p:extLst>
       <p:ext uri="{BB962C8B-B14F-4D97-AF65-F5344CB8AC3E}">
-        <p14:creationId xmlns="" xmlns:p14="http://schemas.microsoft.com/office/powerpoint/2010/main" val="4119453461"/>
+        <p14:creationId xmlns:p14="http://schemas.microsoft.com/office/powerpoint/2010/main" xmlns="" val="4119453461"/>
       </p:ext>
     </p:extLst>
   </p:cSld>
@@ -26489,7 +26446,7 @@
     </p:spTree>
     <p:extLst>
       <p:ext uri="{BB962C8B-B14F-4D97-AF65-F5344CB8AC3E}">
-        <p14:creationId xmlns="" xmlns:p14="http://schemas.microsoft.com/office/powerpoint/2010/main" val="4040468497"/>
+        <p14:creationId xmlns:p14="http://schemas.microsoft.com/office/powerpoint/2010/main" xmlns="" val="4040468497"/>
       </p:ext>
     </p:extLst>
   </p:cSld>
@@ -28318,7 +28275,7 @@
     </p:spTree>
     <p:extLst>
       <p:ext uri="{BB962C8B-B14F-4D97-AF65-F5344CB8AC3E}">
-        <p14:creationId xmlns="" xmlns:p14="http://schemas.microsoft.com/office/powerpoint/2010/main" val="2837260841"/>
+        <p14:creationId xmlns:p14="http://schemas.microsoft.com/office/powerpoint/2010/main" xmlns="" val="2837260841"/>
       </p:ext>
     </p:extLst>
   </p:cSld>
@@ -28526,7 +28483,7 @@
     </p:spTree>
     <p:extLst>
       <p:ext uri="{BB962C8B-B14F-4D97-AF65-F5344CB8AC3E}">
-        <p14:creationId xmlns="" xmlns:p14="http://schemas.microsoft.com/office/powerpoint/2010/main" val="493147383"/>
+        <p14:creationId xmlns:p14="http://schemas.microsoft.com/office/powerpoint/2010/main" xmlns="" val="493147383"/>
       </p:ext>
     </p:extLst>
   </p:cSld>
@@ -28672,7 +28629,7 @@
     </p:spTree>
     <p:extLst>
       <p:ext uri="{BB962C8B-B14F-4D97-AF65-F5344CB8AC3E}">
-        <p14:creationId xmlns="" xmlns:p14="http://schemas.microsoft.com/office/powerpoint/2010/main" val="3044843098"/>
+        <p14:creationId xmlns:p14="http://schemas.microsoft.com/office/powerpoint/2010/main" xmlns="" val="3044843098"/>
       </p:ext>
     </p:extLst>
   </p:cSld>
@@ -30056,7 +30013,7 @@
     </p:spTree>
     <p:extLst>
       <p:ext uri="{BB962C8B-B14F-4D97-AF65-F5344CB8AC3E}">
-        <p14:creationId xmlns="" xmlns:p14="http://schemas.microsoft.com/office/powerpoint/2010/main" val="959142970"/>
+        <p14:creationId xmlns:p14="http://schemas.microsoft.com/office/powerpoint/2010/main" xmlns="" val="959142970"/>
       </p:ext>
     </p:extLst>
   </p:cSld>
@@ -31002,7 +30959,7 @@
     </p:spTree>
     <p:extLst>
       <p:ext uri="{BB962C8B-B14F-4D97-AF65-F5344CB8AC3E}">
-        <p14:creationId xmlns="" xmlns:p14="http://schemas.microsoft.com/office/powerpoint/2010/main" val="3621188349"/>
+        <p14:creationId xmlns:p14="http://schemas.microsoft.com/office/powerpoint/2010/main" xmlns="" val="3621188349"/>
       </p:ext>
     </p:extLst>
   </p:cSld>
@@ -32935,7 +32892,7 @@
     </p:spTree>
     <p:extLst>
       <p:ext uri="{BB962C8B-B14F-4D97-AF65-F5344CB8AC3E}">
-        <p14:creationId xmlns="" xmlns:p14="http://schemas.microsoft.com/office/powerpoint/2010/main" val="4259125907"/>
+        <p14:creationId xmlns:p14="http://schemas.microsoft.com/office/powerpoint/2010/main" xmlns="" val="4259125907"/>
       </p:ext>
     </p:extLst>
   </p:cSld>
@@ -33146,7 +33103,7 @@
     </p:spTree>
     <p:extLst>
       <p:ext uri="{BB962C8B-B14F-4D97-AF65-F5344CB8AC3E}">
-        <p14:creationId xmlns="" xmlns:p14="http://schemas.microsoft.com/office/powerpoint/2010/main" val="493147383"/>
+        <p14:creationId xmlns:p14="http://schemas.microsoft.com/office/powerpoint/2010/main" xmlns="" val="493147383"/>
       </p:ext>
     </p:extLst>
   </p:cSld>
@@ -33233,7 +33190,7 @@
     </p:spTree>
     <p:extLst>
       <p:ext uri="{BB962C8B-B14F-4D97-AF65-F5344CB8AC3E}">
-        <p14:creationId xmlns="" xmlns:p14="http://schemas.microsoft.com/office/powerpoint/2010/main" val="1162483000"/>
+        <p14:creationId xmlns:p14="http://schemas.microsoft.com/office/powerpoint/2010/main" xmlns="" val="1162483000"/>
       </p:ext>
     </p:extLst>
   </p:cSld>
@@ -33354,7 +33311,7 @@
     </p:spTree>
     <p:extLst>
       <p:ext uri="{BB962C8B-B14F-4D97-AF65-F5344CB8AC3E}">
-        <p14:creationId xmlns="" xmlns:p14="http://schemas.microsoft.com/office/powerpoint/2010/main" val="1543278352"/>
+        <p14:creationId xmlns:p14="http://schemas.microsoft.com/office/powerpoint/2010/main" xmlns="" val="1543278352"/>
       </p:ext>
     </p:extLst>
   </p:cSld>
@@ -33678,7 +33635,7 @@
     </p:spTree>
     <p:extLst>
       <p:ext uri="{BB962C8B-B14F-4D97-AF65-F5344CB8AC3E}">
-        <p14:creationId xmlns="" xmlns:p14="http://schemas.microsoft.com/office/powerpoint/2010/main" val="82981547"/>
+        <p14:creationId xmlns:p14="http://schemas.microsoft.com/office/powerpoint/2010/main" xmlns="" val="82981547"/>
       </p:ext>
     </p:extLst>
   </p:cSld>
@@ -34622,7 +34579,7 @@
     </p:spTree>
     <p:extLst>
       <p:ext uri="{BB962C8B-B14F-4D97-AF65-F5344CB8AC3E}">
-        <p14:creationId xmlns="" xmlns:p14="http://schemas.microsoft.com/office/powerpoint/2010/main" val="3166308526"/>
+        <p14:creationId xmlns:p14="http://schemas.microsoft.com/office/powerpoint/2010/main" xmlns="" val="3166308526"/>
       </p:ext>
     </p:extLst>
   </p:cSld>
@@ -35387,7 +35344,7 @@
     </p:spTree>
     <p:extLst>
       <p:ext uri="{BB962C8B-B14F-4D97-AF65-F5344CB8AC3E}">
-        <p14:creationId xmlns="" xmlns:p14="http://schemas.microsoft.com/office/powerpoint/2010/main" val="3166308526"/>
+        <p14:creationId xmlns:p14="http://schemas.microsoft.com/office/powerpoint/2010/main" xmlns="" val="3166308526"/>
       </p:ext>
     </p:extLst>
   </p:cSld>
@@ -36333,7 +36290,7 @@
     </p:spTree>
     <p:extLst>
       <p:ext uri="{BB962C8B-B14F-4D97-AF65-F5344CB8AC3E}">
-        <p14:creationId xmlns="" xmlns:p14="http://schemas.microsoft.com/office/powerpoint/2010/main" val="3166308526"/>
+        <p14:creationId xmlns:p14="http://schemas.microsoft.com/office/powerpoint/2010/main" xmlns="" val="3166308526"/>
       </p:ext>
     </p:extLst>
   </p:cSld>
@@ -37553,7 +37510,7 @@
     </p:spTree>
     <p:extLst>
       <p:ext uri="{BB962C8B-B14F-4D97-AF65-F5344CB8AC3E}">
-        <p14:creationId xmlns="" xmlns:p14="http://schemas.microsoft.com/office/powerpoint/2010/main" val="3166308526"/>
+        <p14:creationId xmlns:p14="http://schemas.microsoft.com/office/powerpoint/2010/main" xmlns="" val="3166308526"/>
       </p:ext>
     </p:extLst>
   </p:cSld>
@@ -38542,7 +38499,7 @@
     </p:spTree>
     <p:extLst>
       <p:ext uri="{BB962C8B-B14F-4D97-AF65-F5344CB8AC3E}">
-        <p14:creationId xmlns="" xmlns:p14="http://schemas.microsoft.com/office/powerpoint/2010/main" val="3166308526"/>
+        <p14:creationId xmlns:p14="http://schemas.microsoft.com/office/powerpoint/2010/main" xmlns="" val="3166308526"/>
       </p:ext>
     </p:extLst>
   </p:cSld>

</xml_diff>